<commit_message>
Add back in footnote & endnote metadata so that we can copy them into a comment in the reverse pipeline. Fix issue with numbering. Update sample_slides_output to contain the metadata for annotations.
</commit_message>
<xml_diff>
--- a/src/manuscript2slides/resources/sample_slides_output.pptx
+++ b/src/manuscript2slides/resources/sample_slides_output.pptx
@@ -222,7 +222,7 @@
           <a:p>
             <a:fld id="{21F925AA-DF56-4E9B-BD17-5F928015F194}" type="datetimeFigureOut">
               <a:rPr lang="en-US" smtClean="0"/>
-              <a:t>9/8/2025</a:t>
+              <a:t>10/10/2025</a:t>
             </a:fld>
             <a:endParaRPr lang="en-US"/>
           </a:p>
@@ -612,7 +612,7 @@
               <a:t>{
   "headings": [
     {
-      "text": "[Link: https://dataepics.webflow.io/stories/where-are-data]Where are Data?",
+      "text": "[Link: https://dataepics.webflow.io/stories/where-are-data] Where are Data?",
       "style_id": "Heading1",
       "name": "Heading 1"
     }
@@ -727,21 +727,6 @@
           <a:bodyPr/>
           <a:lstStyle/>
           <a:p/>
-          <a:p/>
-          <a:p>
-            <a:r>
-              <a:t>
-START OF COPIED NOTES FROM SOURCE DOCX
-========================================
-</a:t>
-            </a:r>
-          </a:p>
-          <a:p>
-            <a:r>
-              <a:t>========================================
-END OF COPIED NOTES FROM SOURCE DOCX</a:t>
-            </a:r>
-          </a:p>
         </p:txBody>
       </p:sp>
       <p:sp>
@@ -827,7 +812,7 @@
           <a:p>
             <a:r>
               <a:t>
-11. . DeeeeLAN. “Homebridge-Sleepiq/Readme.md at Master · DeeeeLAN/Homebridge-Sleepiq.” GitHub, November 14, 2020. https://github.com/DeeeeLAN/homebridge-sleepiq/blob/master/README.md. 
+11. DeeeeLAN. “Homebridge-Sleepiq/Readme.md at Master · DeeeeLAN/Homebridge-Sleepiq.” GitHub, November 14, 2020. https://github.com/DeeeeLAN/homebridge-sleepiq/blob/master/README.md. 
 Hyperlinks:
 https://github.com/DeeeeLAN/homebridge-sleepiq/blob/master/README.md</a:t>
             </a:r>
@@ -836,6 +821,37 @@
             <a:r>
               <a:t>========================================
 END OF COPIED NOTES FROM SOURCE DOCX</a:t>
+            </a:r>
+          </a:p>
+          <a:p>
+            <a:r>
+              <a:t>
+START OF JSON METADATA FROM SOURCE DOCUMENT
+========================================</a:t>
+            </a:r>
+          </a:p>
+          <a:p/>
+          <a:p>
+            <a:r>
+              <a:t>{
+  "footnotes": [
+    {
+      "id": "11",
+      "text_body": "DeeeeLAN. \u201cHomebridge-Sleepiq/Readme.md at Master \u00b7 DeeeeLAN/Homebridge-Sleepiq.\u201d GitHub, November 14, 2020. https://github.com/DeeeeLAN/homebridge-sleepiq/blob/master/README.md. ",
+      "hyperlinks": [
+        "https://github.com/DeeeeLAN/homebridge-sleepiq/blob/master/README.md"
+      ],
+      "reference_text": "Or, this whole process is interrupted by a GitHub homebrew",
+      "note_type": "footnote"
+    }
+  ]
+}</a:t>
+            </a:r>
+          </a:p>
+          <a:p>
+            <a:r>
+              <a:t>========================================
+END OF JSON METADATA FROM SOURCE DOCUMENT</a:t>
             </a:r>
           </a:p>
         </p:txBody>
@@ -923,7 +939,7 @@
           <a:p>
             <a:r>
               <a:t>
-12. . Piper Lane. “We, You &amp; I: Experimenting with Points of View.” Hugo House. Lecture, June 2020. https://hugohouse.org/store/class/we-you-i-experimenting-with-points-of-view-piper-lane/ — In this course, Piper Lane taught that an effective technique of writing the collective “we” point of view is “shimmering between bodies.” When you write the “we” point-of-view, there’s always risk of flattening that collective in a limiting way instead of communicating the expansive coalition. It is hard to feel close to the story without a body to be in. It can be hard to be interested in the story. The narrative drive is hard to pull off, too, since conflict is usually between individuals. Inhabiting individual bodies and then shimmering between them can ground the reader and help the narrative feel more dynamic. Another point Lane taught was that wherever there is a “we,” there is a chance there is a “they.”
+12. Piper Lane. “We, You &amp; I: Experimenting with Points of View.” Hugo House. Lecture, June 2020. https://hugohouse.org/store/class/we-you-i-experimenting-with-points-of-view-piper-lane/ — In this course, Piper Lane taught that an effective technique of writing the collective “we” point of view is “shimmering between bodies.” When you write the “we” point-of-view, there’s always risk of flattening that collective in a limiting way instead of communicating the expansive coalition. It is hard to feel close to the story without a body to be in. It can be hard to be interested in the story. The narrative drive is hard to pull off, too, since conflict is usually between individuals. Inhabiting individual bodies and then shimmering between them can ground the reader and help the narrative feel more dynamic. Another point Lane taught was that wherever there is a “we,” there is a chance there is a “they.”
 </a:t>
             </a:r>
           </a:p>
@@ -931,6 +947,35 @@
             <a:r>
               <a:t>========================================
 END OF COPIED NOTES FROM SOURCE DOCX</a:t>
+            </a:r>
+          </a:p>
+          <a:p>
+            <a:r>
+              <a:t>
+START OF JSON METADATA FROM SOURCE DOCUMENT
+========================================</a:t>
+            </a:r>
+          </a:p>
+          <a:p/>
+          <a:p>
+            <a:r>
+              <a:t>{
+  "footnotes": [
+    {
+      "id": "12",
+      "text_body": "Piper Lane. \u201cWe, You &amp; I: Experimenting with Points of View.\u201d Hugo House. Lecture, June 2020. https://hugohouse.org/store/class/we-you-i-experimenting-with-points-of-view-piper-lane/ \u2014 In this course, Piper Lane taught that an effective technique of writing the collective \u201cwe\u201d point of view is \u201cshimmering between bodies.\u201d When you write the \u201cwe\u201d point-of-view, there\u2019s always risk of flattening that collective in a limiting way instead of communicating the expansive coalition. It is hard to feel close to the story without a body to be in. It can be hard to be interested in the story. The narrative drive is hard to pull off, too, since conflict is usually between individuals. Inhabiting individual bodies and then shimmering between them can ground the reader and help the narrative feel more dynamic. Another point Lane taught was that wherever there is a \u201cwe,\u201d there is a chance there is a \u201cthey.\u201d",
+      "hyperlinks": [],
+      "reference_text": "However we are pulled\u2014directly from the home network or in",
+      "note_type": "footnote"
+    }
+  ]
+}</a:t>
+            </a:r>
+          </a:p>
+          <a:p>
+            <a:r>
+              <a:t>========================================
+END OF JSON METADATA FROM SOURCE DOCUMENT</a:t>
             </a:r>
           </a:p>
         </p:txBody>
@@ -1018,7 +1063,7 @@
           <a:p>
             <a:r>
               <a:t>
-13. . Corinne Manning. “First Person Omniscience.” Hugo House. Lecture, July 2021. https://hugohouse.org/store/class/first-person-omniscence-corinne-manning/
+13. Corinne Manning. “First Person Omniscience.” Hugo House. Lecture, July 2021. https://hugohouse.org/store/class/first-person-omniscence-corinne-manning/
 Hyperlinks:
 https://hugohouse.org/store/class/first-person-omniscence-corinne-manning/</a:t>
             </a:r>
@@ -1045,6 +1090,17 @@
       "text": "# Esoterica: can we have meaningful existences?",
       "style_id": "Heading2",
       "name": "Heading 2"
+    }
+  ],
+  "footnotes": [
+    {
+      "id": "13",
+      "text_body": "Corinne Manning. \u201cFirst Person Omniscience.\u201d Hugo House. Lecture, July 2021. https://hugohouse.org/store/class/first-person-omniscence-corinne-manning/",
+      "hyperlinks": [
+        "https://hugohouse.org/store/class/first-person-omniscence-corinne-manning/"
+      ],
+      "reference_text": "One of you has taught that, when writing, true omniscience",
+      "note_type": "footnote"
     }
   ]
 }</a:t>
@@ -1141,7 +1197,7 @@
           <a:p>
             <a:r>
               <a:t>
-14. . Iain McGilchrist. The Master and His Emissary: The Divided Brain and the Making of the Western World. New Haven, CT: Yale University Press, 2019.For an overview, see this podcast episode: Shankar Vedantam and Iain McGilchrist. “One Head, Two Brains.” Hidden Brain Media, April 30, 2021. https://hiddenbrain.org/podcast/one-head-two-brains/.
+14. Iain McGilchrist. The Master and His Emissary: The Divided Brain and the Making of the Western World. New Haven, CT: Yale University Press, 2019.For an overview, see this podcast episode: Shankar Vedantam and Iain McGilchrist. “One Head, Two Brains.” Hidden Brain Media, April 30, 2021. https://hiddenbrain.org/podcast/one-head-two-brains/.
 </a:t>
             </a:r>
           </a:p>
@@ -1149,6 +1205,35 @@
             <a:r>
               <a:t>========================================
 END OF COPIED NOTES FROM SOURCE DOCX</a:t>
+            </a:r>
+          </a:p>
+          <a:p>
+            <a:r>
+              <a:t>
+START OF JSON METADATA FROM SOURCE DOCUMENT
+========================================</a:t>
+            </a:r>
+          </a:p>
+          <a:p/>
+          <a:p>
+            <a:r>
+              <a:t>{
+  "footnotes": [
+    {
+      "id": "14",
+      "text_body": "Iain McGilchrist. The Master and His Emissary: The Divided Brain and the Making of the Western World. New Haven, CT: Yale University Press, 2019.For an overview, see this podcast episode: Shankar Vedantam and Iain McGilchrist. \u201cOne Head, Two Brains.\u201d Hidden Brain Media, April 30, 2021. https://hiddenbrain.org/podcast/one-head-two-brains/.",
+      "hyperlinks": [],
+      "reference_text": "Another of you spent two decades in psychiatry researching and",
+      "note_type": "footnote"
+    }
+  ]
+}</a:t>
+            </a:r>
+          </a:p>
+          <a:p>
+            <a:r>
+              <a:t>========================================
+END OF JSON METADATA FROM SOURCE DOCUMENT</a:t>
             </a:r>
           </a:p>
         </p:txBody>
@@ -1217,21 +1302,6 @@
           <a:bodyPr/>
           <a:lstStyle/>
           <a:p/>
-          <a:p/>
-          <a:p>
-            <a:r>
-              <a:t>
-START OF COPIED NOTES FROM SOURCE DOCX
-========================================
-</a:t>
-            </a:r>
-          </a:p>
-          <a:p>
-            <a:r>
-              <a:t>========================================
-END OF COPIED NOTES FROM SOURCE DOCX</a:t>
-            </a:r>
-          </a:p>
         </p:txBody>
       </p:sp>
       <p:sp>
@@ -1317,7 +1387,7 @@
           <a:p>
             <a:r>
               <a:t>
-15. . Audrey Desjardins. “The Data Epics: What If a Fiction Writer Wrote a Story Based on Your Own Home Data? We Are Looking for Participants to Be Part of a Study about Interpreting Smart Devices and Data in the Home through the Creative Medium of Fiction Writing. #Design #Fiction #DATA #Iot Pic.twitter.com/7vomtvgren.” Twitter. Twitter, January 27, 2021. https://twitter.com/designeraudrey/status/1354491091043532802?lang=en.Speculative Futures Seattle. “Speculative Futures in Practice: Audrey Desjardins.” Medium. Medium, February 21, 2020. https://medium.com/@speculativesea/speculative-futures-in-practice-audrey-desjardins-3cb5f9192ac1. “Audrey Desjardins: Data Imaginaries,” Audrey Desjardins: Data Imaginaries | School of Art + Art History + Design | University of Washington, 2021, https://art.washington.edu/news/2021/09/13/audrey-desjardins-data-imaginaries.
+15. Audrey Desjardins. “The Data Epics: What If a Fiction Writer Wrote a Story Based on Your Own Home Data? We Are Looking for Participants to Be Part of a Study about Interpreting Smart Devices and Data in the Home through the Creative Medium of Fiction Writing. #Design #Fiction #DATA #Iot Pic.twitter.com/7vomtvgren.” Twitter. Twitter, January 27, 2021. https://twitter.com/designeraudrey/status/1354491091043532802?lang=en.Speculative Futures Seattle. “Speculative Futures in Practice: Audrey Desjardins.” Medium. Medium, February 21, 2020. https://medium.com/@speculativesea/speculative-futures-in-practice-audrey-desjardins-3cb5f9192ac1. “Audrey Desjardins: Data Imaginaries,” Audrey Desjardins: Data Imaginaries | School of Art + Art History + Design | University of Washington, 2021, https://art.washington.edu/news/2021/09/13/audrey-desjardins-data-imaginaries.
 Hyperlinks:
 https://twitter.com/designeraudrey/status/1354491091043532802?lang=en
 https://art.washington.edu/news/2021/09/13/audrey-desjardins-data-imaginaries</a:t>
@@ -1327,6 +1397,38 @@
             <a:r>
               <a:t>========================================
 END OF COPIED NOTES FROM SOURCE DOCX</a:t>
+            </a:r>
+          </a:p>
+          <a:p>
+            <a:r>
+              <a:t>
+START OF JSON METADATA FROM SOURCE DOCUMENT
+========================================</a:t>
+            </a:r>
+          </a:p>
+          <a:p/>
+          <a:p>
+            <a:r>
+              <a:t>{
+  "footnotes": [
+    {
+      "id": "15",
+      "text_body": "Audrey Desjardins. \u201cThe Data Epics: What If a Fiction Writer Wrote a Story Based on Your Own Home Data? We Are Looking for Participants to Be Part of a Study about Interpreting Smart Devices and Data in the Home through the Creative Medium of Fiction Writing. #Design #Fiction #DATA #Iot Pic.twitter.com/7vomtvgren.\u201d Twitter. Twitter, January 27, 2021. https://twitter.com/designeraudrey/status/1354491091043532802?lang=en.Speculative Futures Seattle. \u201cSpeculative Futures in Practice: Audrey Desjardins.\u201d Medium. Medium, February 21, 2020. https://medium.com/@speculativesea/speculative-futures-in-practice-audrey-desjardins-3cb5f9192ac1. \u201cAudrey Desjardins: Data Imaginaries,\u201d Audrey Desjardins: Data Imaginaries | School of Art + Art History + Design | University of Washington, 2021, https://art.washington.edu/news/2021/09/13/audrey-desjardins-data-imaginaries.",
+      "hyperlinks": [
+        "https://twitter.com/designeraudrey/status/1354491091043532802?lang=en",
+        "https://art.washington.edu/news/2021/09/13/audrey-desjardins-data-imaginaries"
+      ],
+      "reference_text": "(Is that, perhaps, even the purpose of the very project",
+      "note_type": "footnote"
+    }
+  ]
+}</a:t>
+            </a:r>
+          </a:p>
+          <a:p>
+            <a:r>
+              <a:t>========================================
+END OF JSON METADATA FROM SOURCE DOCUMENT</a:t>
             </a:r>
           </a:p>
         </p:txBody>
@@ -1414,7 +1516,7 @@
           <a:p>
             <a:r>
               <a:t>
-16. . Soren Kierkegaard, various writings. (It is difficult to cite a single source here since these are ideas Kierkegaard grew and developed over his full bibliography of writing. However, here is a worthy thesis on the subject: Caroline Moore, "Kierkegaard on Truth" (2015). Undergraduate Theses and Capstone Projects. 81. https://digitalshowcase.lynchburg.edu/utcp/81 Here, as well, are the sources the writer happened to be immersed in at the time of developing and writing this piece:George Conell and Charleton Heston. Soren Kierkegaard (Audio Classics: The Giants of Philosophy). Ashland, OR: Blackstone Publishing, 2006. Paul Strathern. Kierkegaard in 90 Minutes. Ashland, OR: Blackstone Publishing, 2004.)
+16. Soren Kierkegaard, various writings. (It is difficult to cite a single source here since these are ideas Kierkegaard grew and developed over his full bibliography of writing. However, here is a worthy thesis on the subject: Caroline Moore, "Kierkegaard on Truth" (2015). Undergraduate Theses and Capstone Projects. 81. https://digitalshowcase.lynchburg.edu/utcp/81 Here, as well, are the sources the writer happened to be immersed in at the time of developing and writing this piece:George Conell and Charleton Heston. Soren Kierkegaard (Audio Classics: The Giants of Philosophy). Ashland, OR: Blackstone Publishing, 2006. Paul Strathern. Kierkegaard in 90 Minutes. Ashland, OR: Blackstone Publishing, 2004.)
 Hyperlinks:
 https://digitalshowcase.lynchburg.edu/utcp/81</a:t>
             </a:r>
@@ -1423,6 +1525,37 @@
             <a:r>
               <a:t>========================================
 END OF COPIED NOTES FROM SOURCE DOCX</a:t>
+            </a:r>
+          </a:p>
+          <a:p>
+            <a:r>
+              <a:t>
+START OF JSON METADATA FROM SOURCE DOCUMENT
+========================================</a:t>
+            </a:r>
+          </a:p>
+          <a:p/>
+          <a:p>
+            <a:r>
+              <a:t>{
+  "footnotes": [
+    {
+      "id": "16",
+      "text_body": "Soren Kierkegaard, various writings. (It is difficult to cite a single source here since these are ideas Kierkegaard grew and developed over his full bibliography of writing. However, here is a worthy thesis on the subject: Caroline Moore, \"Kierkegaard on Truth\" (2015). Undergraduate Theses and Capstone Projects. 81. https://digitalshowcase.lynchburg.edu/utcp/81 Here, as well, are the sources the writer happened to be immersed in at the time of developing and writing this piece:George Conell and Charleton Heston. Soren Kierkegaard (Audio Classics: The Giants of Philosophy). Ashland, OR: Blackstone Publishing, 2006. Paul Strathern. Kierkegaard in 90 Minutes. Ashland, OR: Blackstone Publishing, 2004.)",
+      "hyperlinks": [
+        "https://digitalshowcase.lynchburg.edu/utcp/81"
+      ],
+      "reference_text": "Looking at it another way\u2014another of you, a philosopher, taught",
+      "note_type": "footnote"
+    }
+  ]
+}</a:t>
+            </a:r>
+          </a:p>
+          <a:p>
+            <a:r>
+              <a:t>========================================
+END OF JSON METADATA FROM SOURCE DOCUMENT</a:t>
             </a:r>
           </a:p>
         </p:txBody>
@@ -1510,7 +1643,7 @@
           <a:p>
             <a:r>
               <a:t>
-17. . Frankl, Viktor E. Man's Search for Meaning. London: Rider Books, 2020.Alfred Adler, one of Frankl’s predecessors, espoused an earlier iteration of this philosophy in his teachings on Individual Psychology. He said: “The meaning of life must be created by each individual. We must not be presented with it. It would not work if we were presented with it. We have to strive for it.” In: Karen A. Drescher, and Mark H. Stone. Adler Speaks: The Lectures of Alfred Adler, 2. Lincoln, NE: iUniverse, Inc., 2004.Another article positing a very similar philosophy without reference to Frank can be found in: Arthur C. Brooks “The Difference between Hope and Optimism.” The Atlantic. Atlantic Media Company, September 23, 2021. https://www.theatlantic.com/family/archive/2021/09/hope-optimism-happiness/620164/. 
+17. Frankl, Viktor E. Man's Search for Meaning. London: Rider Books, 2020.Alfred Adler, one of Frankl’s predecessors, espoused an earlier iteration of this philosophy in his teachings on Individual Psychology. He said: “The meaning of life must be created by each individual. We must not be presented with it. It would not work if we were presented with it. We have to strive for it.” In: Karen A. Drescher, and Mark H. Stone. Adler Speaks: The Lectures of Alfred Adler, 2. Lincoln, NE: iUniverse, Inc., 2004.Another article positing a very similar philosophy without reference to Frank can be found in: Arthur C. Brooks “The Difference between Hope and Optimism.” The Atlantic. Atlantic Media Company, September 23, 2021. https://www.theatlantic.com/family/archive/2021/09/hope-optimism-happiness/620164/. 
 Hyperlinks:
 https://www.theatlantic.com/family/archive/2021/09/hope-optimism-happiness/620164/</a:t>
             </a:r>
@@ -1519,6 +1652,37 @@
             <a:r>
               <a:t>========================================
 END OF COPIED NOTES FROM SOURCE DOCX</a:t>
+            </a:r>
+          </a:p>
+          <a:p>
+            <a:r>
+              <a:t>
+START OF JSON METADATA FROM SOURCE DOCUMENT
+========================================</a:t>
+            </a:r>
+          </a:p>
+          <a:p/>
+          <a:p>
+            <a:r>
+              <a:t>{
+  "footnotes": [
+    {
+      "id": "17",
+      "text_body": "Frankl, Viktor E. Man's Search for Meaning. London: Rider Books, 2020.Alfred Adler, one of Frankl\u2019s predecessors, espoused an earlier iteration of this philosophy in his teachings on Individual Psychology. He said: \u201cThe meaning of life must be created by each individual. We must not be presented with it. It would not work if we were presented with it. We have to strive for it.\u201d In: Karen A. Drescher, and Mark H. Stone. Adler Speaks: The Lectures of Alfred Adler, 2. Lincoln, NE: iUniverse, Inc., 2004.Another article positing a very similar philosophy without reference to Frank can be found in: Arthur C. Brooks \u201cThe Difference between Hope and Optimism.\u201d The Atlantic. Atlantic Media Company, September 23, 2021. https://www.theatlantic.com/family/archive/2021/09/hope-optimism-happiness/620164/. ",
+      "hyperlinks": [
+        "https://www.theatlantic.com/family/archive/2021/09/hope-optimism-happiness/620164/"
+      ],
+      "reference_text": "Yet another of you has taught a philosophy not named",
+      "note_type": "footnote"
+    }
+  ]
+}</a:t>
+            </a:r>
+          </a:p>
+          <a:p>
+            <a:r>
+              <a:t>========================================
+END OF JSON METADATA FROM SOURCE DOCUMENT</a:t>
             </a:r>
           </a:p>
         </p:txBody>
@@ -1587,21 +1751,6 @@
           <a:bodyPr/>
           <a:lstStyle/>
           <a:p/>
-          <a:p/>
-          <a:p>
-            <a:r>
-              <a:t>
-START OF COPIED NOTES FROM SOURCE DOCX
-========================================
-</a:t>
-            </a:r>
-          </a:p>
-          <a:p>
-            <a:r>
-              <a:t>========================================
-END OF COPIED NOTES FROM SOURCE DOCX</a:t>
-            </a:r>
-          </a:p>
           <a:p>
             <a:r>
               <a:t>
@@ -1735,7 +1884,7 @@
           <a:p>
             <a:r>
               <a:t>
-1. 1. James Griffiths. “The Global Internet Is Powered by Vast Undersea Cables ...” CNN, July 26, 2019. https://www.cnn.com/2019/07/25/asia/internet-undersea-cables-intl-hnk/index.html.
+1. James Griffiths. “The Global Internet Is Powered by Vast Undersea Cables ...” CNN, July 26, 2019. https://www.cnn.com/2019/07/25/asia/internet-undersea-cables-intl-hnk/index.html.
 Hyperlinks:
 https://www.cnn.com/2019/07/25/asia/internet-undersea-cables-intl-hnk/index.html</a:t>
             </a:r>
@@ -1783,6 +1932,17 @@
       "reference_text": "In a cold concrete underground tunnel, we pass through a",
       "id": 4
     }
+  ],
+  "footnotes": [
+    {
+      "id": "1",
+      "text_body": "James Griffiths. \u201cThe Global Internet Is Powered by Vast Undersea Cables ...\u201d CNN, July 26, 2019. https://www.cnn.com/2019/07/25/asia/internet-undersea-cables-intl-hnk/index.html.",
+      "hyperlinks": [
+        "https://www.cnn.com/2019/07/25/asia/internet-undersea-cables-intl-hnk/index.html"
+      ],
+      "reference_text": "In a cold concrete underground tunnel, we pass through a",
+      "note_type": "footnote"
+    }
   ]
 }</a:t>
             </a:r>
@@ -1859,21 +2019,6 @@
           <a:bodyPr/>
           <a:lstStyle/>
           <a:p/>
-          <a:p/>
-          <a:p>
-            <a:r>
-              <a:t>
-START OF COPIED NOTES FROM SOURCE DOCX
-========================================
-</a:t>
-            </a:r>
-          </a:p>
-          <a:p>
-            <a:r>
-              <a:t>========================================
-END OF COPIED NOTES FROM SOURCE DOCX</a:t>
-            </a:r>
-          </a:p>
           <a:p>
             <a:r>
               <a:t>
@@ -1967,21 +2112,6 @@
           <a:bodyPr/>
           <a:lstStyle/>
           <a:p/>
-          <a:p/>
-          <a:p>
-            <a:r>
-              <a:t>
-START OF COPIED NOTES FROM SOURCE DOCX
-========================================
-</a:t>
-            </a:r>
-          </a:p>
-          <a:p>
-            <a:r>
-              <a:t>========================================
-END OF COPIED NOTES FROM SOURCE DOCX</a:t>
-            </a:r>
-          </a:p>
         </p:txBody>
       </p:sp>
       <p:sp>
@@ -2048,21 +2178,6 @@
           <a:bodyPr/>
           <a:lstStyle/>
           <a:p/>
-          <a:p/>
-          <a:p>
-            <a:r>
-              <a:t>
-START OF COPIED NOTES FROM SOURCE DOCX
-========================================
-</a:t>
-            </a:r>
-          </a:p>
-          <a:p>
-            <a:r>
-              <a:t>========================================
-END OF COPIED NOTES FROM SOURCE DOCX</a:t>
-            </a:r>
-          </a:p>
         </p:txBody>
       </p:sp>
       <p:sp>
@@ -2159,6 +2274,37 @@
 END OF COPIED NOTES FROM SOURCE DOCX</a:t>
             </a:r>
           </a:p>
+          <a:p>
+            <a:r>
+              <a:t>
+START OF JSON METADATA FROM SOURCE DOCUMENT
+========================================</a:t>
+            </a:r>
+          </a:p>
+          <a:p/>
+          <a:p>
+            <a:r>
+              <a:t>{
+  "endnotes": [
+    {
+      "id": "2",
+      "text_body": " Another sample endnote with a url at https://dataepics.webflow.io/stories/where-are-data ",
+      "hyperlinks": [
+        "https://dataepics.webflow.io/stories/where-are-data"
+      ],
+      "reference_text": "Vedantam, Shankar, and Iain McGilchrist. \u201cOne Head, Two Brains.\u201d Hidden",
+      "note_type": "endnote"
+    }
+  ]
+}</a:t>
+            </a:r>
+          </a:p>
+          <a:p>
+            <a:r>
+              <a:t>========================================
+END OF JSON METADATA FROM SOURCE DOCUMENT</a:t>
+            </a:r>
+          </a:p>
         </p:txBody>
       </p:sp>
       <p:sp>
@@ -2244,7 +2390,7 @@
           <a:p>
             <a:r>
               <a:t>
-2. . Monika Dommann, Hannes Rickli, and Max Stadler. Data Centers: Edges of a Wired Nation, 91, 117-121, 126-127, 330-331. Zurich, Switzerland: Lars Müller Publishers, 2020.
+2. Monika Dommann, Hannes Rickli, and Max Stadler. Data Centers: Edges of a Wired Nation, 91, 117-121, 126-127, 330-331. Zurich, Switzerland: Lars Müller Publishers, 2020.
 </a:t>
             </a:r>
           </a:p>
@@ -2266,6 +2412,44 @@
             <a:r>
               <a:t>========================================
 END OF COPIED NOTES FROM SOURCE DOCX</a:t>
+            </a:r>
+          </a:p>
+          <a:p>
+            <a:r>
+              <a:t>
+START OF JSON METADATA FROM SOURCE DOCUMENT
+========================================</a:t>
+            </a:r>
+          </a:p>
+          <a:p/>
+          <a:p>
+            <a:r>
+              <a:t>{
+  "footnotes": [
+    {
+      "id": "2",
+      "text_body": "Monika Dommann, Hannes Rickli, and Max Stadler. Data Centers: Edges of a Wired Nation, 91, 117-121, 126-127, 330-331. Zurich, Switzerland: Lars Mu\u0308ller Publishers, 2020.",
+      "hyperlinks": [],
+      "reference_text": "Or, so we imagine. Apart from the monster keeping the",
+      "note_type": "footnote"
+    }
+  ],
+  "endnotes": [
+    {
+      "id": "1",
+      "text_body": " A sample endnote.",
+      "hyperlinks": [],
+      "reference_text": "No one else comes down here regularly but us and",
+      "note_type": "endnote"
+    }
+  ]
+}</a:t>
+            </a:r>
+          </a:p>
+          <a:p>
+            <a:r>
+              <a:t>========================================
+END OF JSON METADATA FROM SOURCE DOCUMENT</a:t>
             </a:r>
           </a:p>
         </p:txBody>
@@ -2353,7 +2537,7 @@
           <a:p>
             <a:r>
               <a:t>
-3. . Bob Dormon, “How the Internet Works: Submarine Fiber, Brains in Jars, and Coaxial Cables,” Ars Technica, May 26, 2016, https://arstechnica.com/information-technology/2016/05/how-the-internet-works-submarine-cables-data-centres-last-mile/. 
+3. Bob Dormon, “How the Internet Works: Submarine Fiber, Brains in Jars, and Coaxial Cables,” Ars Technica, May 26, 2016, https://arstechnica.com/information-technology/2016/05/how-the-internet-works-submarine-cables-data-centres-last-mile/. 
 Hyperlinks:
 https://arstechnica.com/information-technology/2016/05/how-the-internet-works-submarine-cables-data-centres-last-mile/</a:t>
             </a:r>
@@ -2361,7 +2545,7 @@
           <a:p>
             <a:r>
               <a:t>
-4. . Dommann, 123, 321.
+4. Dommann, 123, 321.
 </a:t>
             </a:r>
           </a:p>
@@ -2369,6 +2553,44 @@
             <a:r>
               <a:t>========================================
 END OF COPIED NOTES FROM SOURCE DOCX</a:t>
+            </a:r>
+          </a:p>
+          <a:p>
+            <a:r>
+              <a:t>
+START OF JSON METADATA FROM SOURCE DOCUMENT
+========================================</a:t>
+            </a:r>
+          </a:p>
+          <a:p/>
+          <a:p>
+            <a:r>
+              <a:t>{
+  "footnotes": [
+    {
+      "id": "3",
+      "text_body": "Bob Dormon, \u201cHow the Internet Works: Submarine Fiber, Brains in Jars, and Coaxial Cables,\u201d Ars Technica, May 26, 2016, https://arstechnica.com/information-technology/2016/05/how-the-internet-works-submarine-cables-data-centres-last-mile/. ",
+      "hyperlinks": [
+        "https://arstechnica.com/information-technology/2016/05/how-the-internet-works-submarine-cables-data-centres-last-mile/"
+      ],
+      "reference_text": "Up the steel-armored snake and into a landing site\u2014we may",
+      "note_type": "footnote"
+    },
+    {
+      "id": "4",
+      "text_body": "Dommann, 123, 321.",
+      "hyperlinks": [],
+      "reference_text": "Up the steel-armored snake and into a landing site\u2014we may",
+      "note_type": "footnote"
+    }
+  ]
+}</a:t>
+            </a:r>
+          </a:p>
+          <a:p>
+            <a:r>
+              <a:t>========================================
+END OF JSON METADATA FROM SOURCE DOCUMENT</a:t>
             </a:r>
           </a:p>
         </p:txBody>
@@ -2456,21 +2678,21 @@
           <a:p>
             <a:r>
               <a:t>
-5. . Dommann, 86-87 190-191, 194-195.
+5. Dommann, 86-87 190-191, 194-195.
 </a:t>
             </a:r>
           </a:p>
           <a:p>
             <a:r>
               <a:t>
-6. . Dommann, 304.
+6. Dommann, 304.
 </a:t>
             </a:r>
           </a:p>
           <a:p>
             <a:r>
               <a:t>
-7. . Dommann, 323-327.
+7. Dommann, 323-327.
 </a:t>
             </a:r>
           </a:p>
@@ -2478,6 +2700,49 @@
             <a:r>
               <a:t>========================================
 END OF COPIED NOTES FROM SOURCE DOCX</a:t>
+            </a:r>
+          </a:p>
+          <a:p>
+            <a:r>
+              <a:t>
+START OF JSON METADATA FROM SOURCE DOCUMENT
+========================================</a:t>
+            </a:r>
+          </a:p>
+          <a:p/>
+          <a:p>
+            <a:r>
+              <a:t>{
+  "footnotes": [
+    {
+      "id": "5",
+      "text_body": "Dommann, 86-87 190-191, 194-195.",
+      "hyperlinks": [],
+      "reference_text": "We split and scatter amongst so many silent whirring concrete",
+      "note_type": "footnote"
+    },
+    {
+      "id": "6",
+      "text_body": "Dommann, 304.",
+      "hyperlinks": [],
+      "reference_text": "Some match futuristic and sleek visions of marketing materials: dozens",
+      "note_type": "footnote"
+    },
+    {
+      "id": "7",
+      "text_body": "Dommann, 323-327.",
+      "hyperlinks": [],
+      "reference_text": "Or, less expected but still imaginable, we rest in prefab",
+      "note_type": "footnote"
+    }
+  ]
+}</a:t>
+            </a:r>
+          </a:p>
+          <a:p>
+            <a:r>
+              <a:t>========================================
+END OF JSON METADATA FROM SOURCE DOCUMENT</a:t>
             </a:r>
           </a:p>
         </p:txBody>
@@ -2565,7 +2830,7 @@
           <a:p>
             <a:r>
               <a:t>
-8. . BSC-CNS, 2021. https://www.bsc.es/.
+8. BSC-CNS, 2021. https://www.bsc.es/.
 Hyperlinks:
 https://www.bsc.es/</a:t>
             </a:r>
@@ -2573,7 +2838,7 @@
           <a:p>
             <a:r>
               <a:t>
-9. . “Cloud&amp;Heat: Future of Compute: Secure &amp; Energy-Efficient Infrastructures.” Cloud &amp; Heat, September 9, 2021. https://www.cloudandheat.com/.
+9. “Cloud&amp;Heat: Future of Compute: Secure &amp; Energy-Efficient Infrastructures.” Cloud &amp; Heat, September 9, 2021. https://www.cloudandheat.com/.
 Hyperlinks:
 https://www.cloudandheat.com/</a:t>
             </a:r>
@@ -2582,6 +2847,46 @@
             <a:r>
               <a:t>========================================
 END OF COPIED NOTES FROM SOURCE DOCX</a:t>
+            </a:r>
+          </a:p>
+          <a:p>
+            <a:r>
+              <a:t>
+START OF JSON METADATA FROM SOURCE DOCUMENT
+========================================</a:t>
+            </a:r>
+          </a:p>
+          <a:p/>
+          <a:p>
+            <a:r>
+              <a:t>{
+  "footnotes": [
+    {
+      "id": "8",
+      "text_body": "BSC-CNS, 2021. https://www.bsc.es/.",
+      "hyperlinks": [
+        "https://www.bsc.es/"
+      ],
+      "reference_text": "Or, converse to such hidden fortresses, we live on display",
+      "note_type": "footnote"
+    },
+    {
+      "id": "9",
+      "text_body": "\u201cCloud&amp;Heat: Future of Compute: Secure &amp; Energy-Efficient Infrastructures.\u201d Cloud &amp; Heat, September 9, 2021. https://www.cloudandheat.com/.",
+      "hyperlinks": [
+        "https://www.cloudandheat.com/"
+      ],
+      "reference_text": "Or\u2014even harder to hold in one\u2019s mind as a centralized",
+      "note_type": "footnote"
+    }
+  ]
+}</a:t>
+            </a:r>
+          </a:p>
+          <a:p>
+            <a:r>
+              <a:t>========================================
+END OF JSON METADATA FROM SOURCE DOCUMENT</a:t>
             </a:r>
           </a:p>
         </p:txBody>
@@ -2669,7 +2974,7 @@
           <a:p>
             <a:r>
               <a:t>
-10. . Dommann, 16. – “In the German-speaking world, the term ‘data center’ has since increasingly supplanted the term Rechenzentrum (‘computing center’), which had been in use since the 1950s and initially simply referred to ‘large-scale computer facilities’— a building or part of a building with one or more digital computers, peripherals, offices, air conditioning, potted plants, and carpets … The Swiss PTT’s former Electronic Computing Center (Elektronisches Rechenzentrum or ERZ, built in 1967) may stand in here for this forgotten history of the recent past. It is located on the grounds of the PTT’s erstwhile Technology Center in Ostermundigen, next to the historic ‘R&amp;D skyscraper,’ where a rooftop bar and start-ups have recently taken up shop. Anyone wandering through the empty (and asbestos-ridden) offices of the computing center today will encounter remnants: cubicles that were installed there at some point; ‘focus’ modules, into which one could withdraw to think; a few orphaned floppy disks that recall an earlier moment when Switzerland dreamed of becoming a ‘hub’ of information— a hub of ‘electronic markets.’”
+10. Dommann, 16. – “In the German-speaking world, the term ‘data center’ has since increasingly supplanted the term Rechenzentrum (‘computing center’), which had been in use since the 1950s and initially simply referred to ‘large-scale computer facilities’— a building or part of a building with one or more digital computers, peripherals, offices, air conditioning, potted plants, and carpets … The Swiss PTT’s former Electronic Computing Center (Elektronisches Rechenzentrum or ERZ, built in 1967) may stand in here for this forgotten history of the recent past. It is located on the grounds of the PTT’s erstwhile Technology Center in Ostermundigen, next to the historic ‘R&amp;D skyscraper,’ where a rooftop bar and start-ups have recently taken up shop. Anyone wandering through the empty (and asbestos-ridden) offices of the computing center today will encounter remnants: cubicles that were installed there at some point; ‘focus’ modules, into which one could withdraw to think; a few orphaned floppy disks that recall an earlier moment when Switzerland dreamed of becoming a ‘hub’ of information— a hub of ‘electronic markets.’”
 </a:t>
             </a:r>
           </a:p>
@@ -2677,6 +2982,35 @@
             <a:r>
               <a:t>========================================
 END OF COPIED NOTES FROM SOURCE DOCX</a:t>
+            </a:r>
+          </a:p>
+          <a:p>
+            <a:r>
+              <a:t>
+START OF JSON METADATA FROM SOURCE DOCUMENT
+========================================</a:t>
+            </a:r>
+          </a:p>
+          <a:p/>
+          <a:p>
+            <a:r>
+              <a:t>{
+  "footnotes": [
+    {
+      "id": "10",
+      "text_body": "Dommann, 16. \u2013 \u201cIn the German-speaking world, the term \u2018data center\u2019 has since increasingly supplanted the term Rechenzentrum (\u2018computing center\u2019), which had been in use since the 1950s and initially simply referred to \u2018large-scale computer facilities\u2019\u2014 a building or part of a building with one or more digital computers, peripherals, offices, air conditioning, potted plants, and carpets \u2026 The Swiss PTT\u2019s former Electronic Computing Center (Elektronisches Rechenzentrum or ERZ, built in 1967) may stand in here for this forgotten history of the recent past. It is located on the grounds of the PTT\u2019s erstwhile Technology Center in Ostermundigen, next to the historic \u2018R&amp;D skyscraper,\u2019 where a rooftop bar and start-ups have recently taken up shop. Anyone wandering through the empty (and asbestos-ridden) offices of the computing center today will encounter remnants: cubicles that were installed there at some point; \u2018focus\u2019 modules, into which one could withdraw to think; a few orphaned floppy disks that recall an earlier moment when Switzerland dreamed of becoming a \u2018hub\u2019 of information\u2014 a hub of \u2018electronic markets.\u2019\u201d",
+      "hyperlinks": [],
+      "reference_text": "Sometimes our body is in a data center building as",
+      "note_type": "footnote"
+    }
+  ]
+}</a:t>
+            </a:r>
+          </a:p>
+          <a:p>
+            <a:r>
+              <a:t>========================================
+END OF JSON METADATA FROM SOURCE DOCUMENT</a:t>
             </a:r>
           </a:p>
         </p:txBody>
@@ -2745,21 +3079,6 @@
           <a:bodyPr/>
           <a:lstStyle/>
           <a:p/>
-          <a:p/>
-          <a:p>
-            <a:r>
-              <a:t>
-START OF COPIED NOTES FROM SOURCE DOCX
-========================================
-</a:t>
-            </a:r>
-          </a:p>
-          <a:p>
-            <a:r>
-              <a:t>========================================
-END OF COPIED NOTES FROM SOURCE DOCX</a:t>
-            </a:r>
-          </a:p>
         </p:txBody>
       </p:sp>
       <p:sp>
@@ -2826,21 +3145,6 @@
           <a:bodyPr/>
           <a:lstStyle/>
           <a:p/>
-          <a:p/>
-          <a:p>
-            <a:r>
-              <a:t>
-START OF COPIED NOTES FROM SOURCE DOCX
-========================================
-</a:t>
-            </a:r>
-          </a:p>
-          <a:p>
-            <a:r>
-              <a:t>========================================
-END OF COPIED NOTES FROM SOURCE DOCX</a:t>
-            </a:r>
-          </a:p>
           <a:p>
             <a:r>
               <a:t>
@@ -2892,7 +3196,7 @@
 
 <file path=ppt/slideLayouts/slideLayout1.xml><?xml version="1.0" encoding="utf-8"?>
 <p:sldLayout xmlns:a="http://schemas.openxmlformats.org/drawingml/2006/main" xmlns:r="http://schemas.openxmlformats.org/officeDocument/2006/relationships" xmlns:p="http://schemas.openxmlformats.org/presentationml/2006/main" preserve="1" userDrawn="1">
-  <p:cSld name="docx2pptx">
+  <p:cSld name="manuscript2slides">
     <p:spTree>
       <p:nvGrpSpPr>
         <p:cNvPr id="1" name=""/>
@@ -2930,7 +3234,7 @@
           <a:p>
             <a:fld id="{4AF78ED4-71B5-4E4D-9C52-9D18387CE0A0}" type="datetimeFigureOut">
               <a:rPr lang="en-US" smtClean="0"/>
-              <a:t>9/8/2025</a:t>
+              <a:t>10/10/2025</a:t>
             </a:fld>
             <a:endParaRPr lang="en-US"/>
           </a:p>
@@ -3219,7 +3523,7 @@
           <a:p>
             <a:fld id="{4AF78ED4-71B5-4E4D-9C52-9D18387CE0A0}" type="datetimeFigureOut">
               <a:rPr lang="en-US" smtClean="0"/>
-              <a:t>9/8/2025</a:t>
+              <a:t>10/10/2025</a:t>
             </a:fld>
             <a:endParaRPr lang="en-US"/>
           </a:p>
@@ -3640,7 +3944,7 @@
             </a:r>
             <a:r>
               <a:rPr/>
-              <a:t>[Link: https://dataepics.webflow.io/stories/where-are-data]</a:t>
+              <a:t> [Link: https://dataepics.webflow.io/stories/where-are-data] </a:t>
             </a:r>
             <a:r>
               <a:rPr/>
@@ -4514,13 +4818,13 @@
           <a:p>
             <a:r>
               <a:rPr>
-                <a:hlinkClick r:id="rId3"/>
+                <a:hlinkClick r:id="rId2"/>
               </a:rPr>
               <a:t>In a cold concrete underground </a:t>
             </a:r>
             <a:r>
               <a:rPr i="1">
-                <a:hlinkClick r:id="rId3"/>
+                <a:hlinkClick r:id="rId2"/>
               </a:rPr>
               <a:t>tunnel</a:t>
             </a:r>
@@ -4594,7 +4898,7 @@
             </a:r>
             <a:r>
               <a:rPr>
-                <a:hlinkClick r:id="rId4"/>
+                <a:hlinkClick r:id="rId3"/>
               </a:rPr>
               <a:t>just</a:t>
             </a:r>
@@ -4750,25 +5054,41 @@
             </a:r>
             <a:r>
               <a:rPr>
+                <a:hlinkClick r:id="rId2"/>
+              </a:rPr>
+              <a:t>https://art.washington.edu/news/2021/09/13/audrey-desjardins-data-imaginaries</a:t>
+            </a:r>
+            <a:r>
+              <a:rPr/>
+              <a:t>.</a:t>
+            </a:r>
+          </a:p>
+          <a:p>
+            <a:r>
+              <a:rPr/>
+              <a:t>Dormon, Bob. “How the Internet Works: Submarine Fiber, Brains in Jars, and Coaxial Cables.” Ars Technica, May 26, 2016. </a:t>
+            </a:r>
+            <a:r>
+              <a:rPr>
                 <a:hlinkClick r:id="rId3"/>
               </a:rPr>
-              <a:t>https://art.washington.edu/news/2021/09/13/audrey-desjardins-data-imaginaries</a:t>
-            </a:r>
-            <a:r>
-              <a:rPr/>
-              <a:t>.</a:t>
-            </a:r>
-          </a:p>
-          <a:p>
-            <a:r>
-              <a:rPr/>
-              <a:t>Dormon, Bob. “How the Internet Works: Submarine Fiber, Brains in Jars, and Coaxial Cables.” Ars Technica, May 26, 2016. </a:t>
+              <a:t>https://arstechnica.com/information-technology/2016/05/how-the-internet-works-submarine-cables-data-centres-last-mile/</a:t>
+            </a:r>
+            <a:r>
+              <a:rPr/>
+              <a:t>. </a:t>
+            </a:r>
+          </a:p>
+          <a:p>
+            <a:r>
+              <a:rPr/>
+              <a:t>Brooks, Arthur C. “The Difference between Hope and Optimism.” The Atlantic. Atlantic Media Company, September 23, 2021. </a:t>
             </a:r>
             <a:r>
               <a:rPr>
                 <a:hlinkClick r:id="rId4"/>
               </a:rPr>
-              <a:t>https://arstechnica.com/information-technology/2016/05/how-the-internet-works-submarine-cables-data-centres-last-mile/</a:t>
+              <a:t>https://www.theatlantic.com/family/archive/2021/09/hope-optimism-happiness/620164/</a:t>
             </a:r>
             <a:r>
               <a:rPr/>
@@ -4778,13 +5098,13 @@
           <a:p>
             <a:r>
               <a:rPr/>
-              <a:t>Brooks, Arthur C. “The Difference between Hope and Optimism.” The Atlantic. Atlantic Media Company, September 23, 2021. </a:t>
+              <a:t>BSC-CNS, August 31, 1970. </a:t>
             </a:r>
             <a:r>
               <a:rPr>
                 <a:hlinkClick r:id="rId5"/>
               </a:rPr>
-              <a:t>https://www.theatlantic.com/family/archive/2021/09/hope-optimism-happiness/620164/</a:t>
+              <a:t>https://www.bsc.es/</a:t>
             </a:r>
             <a:r>
               <a:rPr/>
@@ -4794,13 +5114,33 @@
           <a:p>
             <a:r>
               <a:rPr/>
-              <a:t>BSC-CNS, August 31, 1970. </a:t>
+              <a:t>“Cloud&amp;Heat: Future of Compute: Secure &amp; Energy-Efficient Infrastructures.” Cloud &amp; Heat, September 9, 2021. https://www.cloudandheat.com/. </a:t>
+            </a:r>
+          </a:p>
+          <a:p>
+            <a:r>
+              <a:rPr/>
+              <a:t>Conell, George, and Charleton Heston. </a:t>
+            </a:r>
+            <a:r>
+              <a:rPr i="1"/>
+              <a:t>Soren Kierkegaard (Audio Classics: The Giants of Philosophy)</a:t>
+            </a:r>
+            <a:r>
+              <a:rPr/>
+              <a:t>. Ashland, OR: Blackstone Publishing, 2006. </a:t>
+            </a:r>
+          </a:p>
+          <a:p>
+            <a:r>
+              <a:rPr/>
+              <a:t>DeeeeLAN. “Homebridge-Sleepiq/Readme.md at Master · DeeeeLAN/Homebridge-Sleepiq.” GitHub, November 14, 2020. </a:t>
             </a:r>
             <a:r>
               <a:rPr>
                 <a:hlinkClick r:id="rId6"/>
               </a:rPr>
-              <a:t>https://www.bsc.es/</a:t>
+              <a:t>https://github.com/DeeeeLAN/homebridge-sleepiq/blob/master/README.md</a:t>
             </a:r>
             <a:r>
               <a:rPr/>
@@ -4810,47 +5150,11 @@
           <a:p>
             <a:r>
               <a:rPr/>
-              <a:t>“Cloud&amp;Heat: Future of Compute: Secure &amp; Energy-Efficient Infrastructures.” Cloud &amp; Heat, September 9, 2021. https://www.cloudandheat.com/. </a:t>
-            </a:r>
-          </a:p>
-          <a:p>
-            <a:r>
-              <a:rPr/>
-              <a:t>Conell, George, and Charleton Heston. </a:t>
-            </a:r>
-            <a:r>
-              <a:rPr i="1"/>
-              <a:t>Soren Kierkegaard (Audio Classics: The Giants of Philosophy)</a:t>
-            </a:r>
-            <a:r>
-              <a:rPr/>
-              <a:t>. Ashland, OR: Blackstone Publishing, 2006. </a:t>
-            </a:r>
-          </a:p>
-          <a:p>
-            <a:r>
-              <a:rPr/>
-              <a:t>DeeeeLAN. “Homebridge-Sleepiq/Readme.md at Master · DeeeeLAN/Homebridge-Sleepiq.” GitHub, November 14, 2020. </a:t>
+              <a:t>Desjardins, Audrey. “The Data Epics: What If a Fiction Writer Wrote a Story Based on Your Own Home Data? We Are Looking for Participants to Be Part of a Study about Interpreting Smart Devices and Data in the Home through the Creative Medium of Fiction Writing. #Design #Fiction #DATA #Iot Pic.twitter.com/7vomtvgren.” Twitter. Twitter, January 27, 2021. </a:t>
             </a:r>
             <a:r>
               <a:rPr>
                 <a:hlinkClick r:id="rId7"/>
-              </a:rPr>
-              <a:t>https://github.com/DeeeeLAN/homebridge-sleepiq/blob/master/README.md</a:t>
-            </a:r>
-            <a:r>
-              <a:rPr/>
-              <a:t>. </a:t>
-            </a:r>
-          </a:p>
-          <a:p>
-            <a:r>
-              <a:rPr/>
-              <a:t>Desjardins, Audrey. “The Data Epics: What If a Fiction Writer Wrote a Story Based on Your Own Home Data? We Are Looking for Participants to Be Part of a Study about Interpreting Smart Devices and Data in the Home through the Creative Medium of Fiction Writing. #Design #Fiction #DATA #Iot Pic.twitter.com/7vomtvgren.” Twitter. Twitter, January 27, 2021. </a:t>
-            </a:r>
-            <a:r>
-              <a:rPr>
-                <a:hlinkClick r:id="rId8"/>
               </a:rPr>
               <a:t>https://twitter.com/designeraudrey/status/1354491091043532802?lang=en</a:t>
             </a:r>
@@ -4942,123 +5246,123 @@
             </a:r>
             <a:r>
               <a:rPr>
+                <a:hlinkClick r:id="rId2"/>
+              </a:rPr>
+              <a:t>https://www.cnn.com/2019/07/25/asia/internet-undersea-cables-intl-hnk/index.html</a:t>
+            </a:r>
+            <a:r>
+              <a:rPr/>
+              <a:t>. </a:t>
+            </a:r>
+          </a:p>
+          <a:p>
+            <a:r>
+              <a:rPr/>
+              <a:t>Lane, Piper. “We, You &amp; I: Experimenting with Points of View.” Hugo House. Lecture, June 2020. </a:t>
+            </a:r>
+            <a:r>
+              <a:rPr>
                 <a:hlinkClick r:id="rId3"/>
               </a:rPr>
-              <a:t>https://www.cnn.com/2019/07/25/asia/internet-undersea-cables-intl-hnk/index.html</a:t>
-            </a:r>
-            <a:r>
-              <a:rPr/>
-              <a:t>. </a:t>
-            </a:r>
-          </a:p>
-          <a:p>
-            <a:r>
-              <a:rPr/>
-              <a:t>Lane, Piper. “We, You &amp; I: Experimenting with Points of View.” Hugo House. Lecture, June 2020. </a:t>
+              <a:t>https://hugohouse.org/store/class/we-you-i-experimenting-with-points-of-view-piper-lane/</a:t>
+            </a:r>
+          </a:p>
+          <a:p>
+            <a:r>
+              <a:rPr/>
+              <a:t>Manning, Corinne. “First Person Omniscience.” </a:t>
+            </a:r>
+            <a:r>
+              <a:rPr i="1"/>
+              <a:t>Hugo House</a:t>
+            </a:r>
+            <a:r>
+              <a:rPr/>
+              <a:t>. Lecture, July 2021. </a:t>
             </a:r>
             <a:r>
               <a:rPr>
                 <a:hlinkClick r:id="rId4"/>
               </a:rPr>
-              <a:t>https://hugohouse.org/store/class/we-you-i-experimenting-with-points-of-view-piper-lane/</a:t>
-            </a:r>
-          </a:p>
-          <a:p>
-            <a:r>
-              <a:rPr/>
-              <a:t>Manning, Corinne. “First Person Omniscience.” </a:t>
+              <a:t>https://hugohouse.org/store/class/first-person-omniscence-corinne-manning/</a:t>
+            </a:r>
+          </a:p>
+          <a:p>
+            <a:r>
+              <a:rPr/>
+              <a:t>McGilchrist, Iain. </a:t>
             </a:r>
             <a:r>
               <a:rPr i="1"/>
-              <a:t>Hugo House</a:t>
-            </a:r>
-            <a:r>
-              <a:rPr/>
-              <a:t>. Lecture, July 2021. </a:t>
+              <a:t>The Master and His Emissary: The Divided Brain and the Making of the Western World</a:t>
+            </a:r>
+            <a:r>
+              <a:rPr/>
+              <a:t>. New Haven, CT: Yale University Press, 2019. </a:t>
+            </a:r>
+          </a:p>
+          <a:p>
+            <a:r>
+              <a:rPr/>
+              <a:t>Moore, Caroline. "Kierkegaard on Truth" (2015). Undergraduate Theses and Capstone Projects. 81. </a:t>
             </a:r>
             <a:r>
               <a:rPr>
                 <a:hlinkClick r:id="rId5"/>
               </a:rPr>
-              <a:t>https://hugohouse.org/store/class/first-person-omniscence-corinne-manning/</a:t>
-            </a:r>
-          </a:p>
-          <a:p>
-            <a:r>
-              <a:rPr/>
-              <a:t>McGilchrist, Iain. </a:t>
-            </a:r>
-            <a:r>
-              <a:rPr i="1"/>
-              <a:t>The Master and His Emissary: The Divided Brain and the Making of the Western World</a:t>
-            </a:r>
-            <a:r>
-              <a:rPr/>
-              <a:t>. New Haven, CT: Yale University Press, 2019. </a:t>
-            </a:r>
-          </a:p>
-          <a:p>
-            <a:r>
-              <a:rPr/>
-              <a:t>Moore, Caroline. "Kierkegaard on Truth" (2015). Undergraduate Theses and Capstone Projects. 81. </a:t>
+              <a:t>https://digitalshowcase.lynchburg.edu/utcp/81</a:t>
+            </a:r>
+            <a:r>
+              <a:rPr/>
+              <a:t> </a:t>
+            </a:r>
+          </a:p>
+          <a:p>
+            <a:r>
+              <a:rPr/>
+              <a:t>Seattle, Speculative Futures. “Speculative Futures in Practice: Audrey Desjardins.” Medium. Medium, February 21, 2020. </a:t>
             </a:r>
             <a:r>
               <a:rPr>
                 <a:hlinkClick r:id="rId6"/>
               </a:rPr>
-              <a:t>https://digitalshowcase.lynchburg.edu/utcp/81</a:t>
-            </a:r>
-            <a:r>
-              <a:rPr/>
-              <a:t> </a:t>
-            </a:r>
-          </a:p>
-          <a:p>
-            <a:r>
-              <a:rPr/>
-              <a:t>Seattle, Speculative Futures. “Speculative Futures in Practice: Audrey Desjardins.” Medium. Medium, February 21, 2020. </a:t>
+              <a:t>https://medium.com/@speculativesea/speculative-futures-in-practice-audrey-desjardins-3cb5f9192ac1</a:t>
+            </a:r>
+            <a:r>
+              <a:rPr/>
+              <a:t>. </a:t>
+            </a:r>
+          </a:p>
+          <a:p>
+            <a:r>
+              <a:rPr/>
+              <a:t>Strathern, Paul. </a:t>
+            </a:r>
+            <a:r>
+              <a:rPr i="1"/>
+              <a:t>Kierkegaard in 90 Minutes</a:t>
+            </a:r>
+            <a:r>
+              <a:rPr/>
+              <a:t>. Ashland, OR: Blackstone Publishing, 2004. </a:t>
+            </a:r>
+          </a:p>
+          <a:p>
+            <a:r>
+              <a:rPr/>
+              <a:t>Vedantam, Shankar,</a:t>
+            </a:r>
+            <a:r>
+              <a:rPr/>
+              <a:t/>
+            </a:r>
+            <a:r>
+              <a:rPr/>
+              <a:t> and Iain McGilchrist. “One Head, Two Brains.” Hidden Brain Media, April 30, 2021. </a:t>
             </a:r>
             <a:r>
               <a:rPr>
                 <a:hlinkClick r:id="rId7"/>
-              </a:rPr>
-              <a:t>https://medium.com/@speculativesea/speculative-futures-in-practice-audrey-desjardins-3cb5f9192ac1</a:t>
-            </a:r>
-            <a:r>
-              <a:rPr/>
-              <a:t>. </a:t>
-            </a:r>
-          </a:p>
-          <a:p>
-            <a:r>
-              <a:rPr/>
-              <a:t>Strathern, Paul. </a:t>
-            </a:r>
-            <a:r>
-              <a:rPr i="1"/>
-              <a:t>Kierkegaard in 90 Minutes</a:t>
-            </a:r>
-            <a:r>
-              <a:rPr/>
-              <a:t>. Ashland, OR: Blackstone Publishing, 2004. </a:t>
-            </a:r>
-          </a:p>
-          <a:p>
-            <a:r>
-              <a:rPr/>
-              <a:t>Vedantam, Shankar,</a:t>
-            </a:r>
-            <a:r>
-              <a:rPr/>
-              <a:t/>
-            </a:r>
-            <a:r>
-              <a:rPr/>
-              <a:t> and Iain McGilchrist. “One Head, Two Brains.” Hidden Brain Media, April 30, 2021. </a:t>
-            </a:r>
-            <a:r>
-              <a:rPr>
-                <a:hlinkClick r:id="rId8"/>
               </a:rPr>
               <a:t>https://hiddenbrain.org/podcast/one-head-two-brains/</a:t>
             </a:r>

</xml_diff>